<commit_message>
Recommiting design document after addding one line
</commit_message>
<xml_diff>
--- a/TZBsGhostBlitz.pptx
+++ b/TZBsGhostBlitz.pptx
@@ -256,7 +256,7 @@
           <a:p>
             <a:fld id="{F14B3FA1-59E2-4D29-B47D-FCBBDE1B50AA}" type="datetimeFigureOut">
               <a:rPr lang="en-US" smtClean="0"/>
-              <a:t>5/6/2015</a:t>
+              <a:t>5/8/2015</a:t>
             </a:fld>
             <a:endParaRPr lang="en-US"/>
           </a:p>
@@ -426,7 +426,7 @@
           <a:p>
             <a:fld id="{F14B3FA1-59E2-4D29-B47D-FCBBDE1B50AA}" type="datetimeFigureOut">
               <a:rPr lang="en-US" smtClean="0"/>
-              <a:t>5/6/2015</a:t>
+              <a:t>5/8/2015</a:t>
             </a:fld>
             <a:endParaRPr lang="en-US"/>
           </a:p>
@@ -606,7 +606,7 @@
           <a:p>
             <a:fld id="{F14B3FA1-59E2-4D29-B47D-FCBBDE1B50AA}" type="datetimeFigureOut">
               <a:rPr lang="en-US" smtClean="0"/>
-              <a:t>5/6/2015</a:t>
+              <a:t>5/8/2015</a:t>
             </a:fld>
             <a:endParaRPr lang="en-US"/>
           </a:p>
@@ -776,7 +776,7 @@
           <a:p>
             <a:fld id="{F14B3FA1-59E2-4D29-B47D-FCBBDE1B50AA}" type="datetimeFigureOut">
               <a:rPr lang="en-US" smtClean="0"/>
-              <a:t>5/6/2015</a:t>
+              <a:t>5/8/2015</a:t>
             </a:fld>
             <a:endParaRPr lang="en-US"/>
           </a:p>
@@ -1022,7 +1022,7 @@
           <a:p>
             <a:fld id="{F14B3FA1-59E2-4D29-B47D-FCBBDE1B50AA}" type="datetimeFigureOut">
               <a:rPr lang="en-US" smtClean="0"/>
-              <a:t>5/6/2015</a:t>
+              <a:t>5/8/2015</a:t>
             </a:fld>
             <a:endParaRPr lang="en-US"/>
           </a:p>
@@ -1254,7 +1254,7 @@
           <a:p>
             <a:fld id="{F14B3FA1-59E2-4D29-B47D-FCBBDE1B50AA}" type="datetimeFigureOut">
               <a:rPr lang="en-US" smtClean="0"/>
-              <a:t>5/6/2015</a:t>
+              <a:t>5/8/2015</a:t>
             </a:fld>
             <a:endParaRPr lang="en-US"/>
           </a:p>
@@ -1621,7 +1621,7 @@
           <a:p>
             <a:fld id="{F14B3FA1-59E2-4D29-B47D-FCBBDE1B50AA}" type="datetimeFigureOut">
               <a:rPr lang="en-US" smtClean="0"/>
-              <a:t>5/6/2015</a:t>
+              <a:t>5/8/2015</a:t>
             </a:fld>
             <a:endParaRPr lang="en-US"/>
           </a:p>
@@ -1739,7 +1739,7 @@
           <a:p>
             <a:fld id="{F14B3FA1-59E2-4D29-B47D-FCBBDE1B50AA}" type="datetimeFigureOut">
               <a:rPr lang="en-US" smtClean="0"/>
-              <a:t>5/6/2015</a:t>
+              <a:t>5/8/2015</a:t>
             </a:fld>
             <a:endParaRPr lang="en-US"/>
           </a:p>
@@ -1834,7 +1834,7 @@
           <a:p>
             <a:fld id="{F14B3FA1-59E2-4D29-B47D-FCBBDE1B50AA}" type="datetimeFigureOut">
               <a:rPr lang="en-US" smtClean="0"/>
-              <a:t>5/6/2015</a:t>
+              <a:t>5/8/2015</a:t>
             </a:fld>
             <a:endParaRPr lang="en-US"/>
           </a:p>
@@ -2111,7 +2111,7 @@
           <a:p>
             <a:fld id="{F14B3FA1-59E2-4D29-B47D-FCBBDE1B50AA}" type="datetimeFigureOut">
               <a:rPr lang="en-US" smtClean="0"/>
-              <a:t>5/6/2015</a:t>
+              <a:t>5/8/2015</a:t>
             </a:fld>
             <a:endParaRPr lang="en-US"/>
           </a:p>
@@ -2364,7 +2364,7 @@
           <a:p>
             <a:fld id="{F14B3FA1-59E2-4D29-B47D-FCBBDE1B50AA}" type="datetimeFigureOut">
               <a:rPr lang="en-US" smtClean="0"/>
-              <a:t>5/6/2015</a:t>
+              <a:t>5/8/2015</a:t>
             </a:fld>
             <a:endParaRPr lang="en-US"/>
           </a:p>
@@ -2577,7 +2577,7 @@
           <a:p>
             <a:fld id="{F14B3FA1-59E2-4D29-B47D-FCBBDE1B50AA}" type="datetimeFigureOut">
               <a:rPr lang="en-US" smtClean="0"/>
-              <a:t>5/6/2015</a:t>
+              <a:t>5/8/2015</a:t>
             </a:fld>
             <a:endParaRPr lang="en-US"/>
           </a:p>
@@ -4063,11 +4063,7 @@
             </a:r>
             <a:r>
               <a:rPr lang="en-US" sz="1200" dirty="0" smtClean="0"/>
-              <a:t>              </a:t>
-            </a:r>
-            <a:r>
-              <a:rPr lang="en-US" sz="1200" dirty="0" smtClean="0"/>
-              <a:t>//decrement score</a:t>
+              <a:t>              //decrement score</a:t>
             </a:r>
           </a:p>
           <a:p>
@@ -4338,7 +4334,7 @@
         <p:spPr>
           <a:xfrm>
             <a:off x="4415203" y="516748"/>
-            <a:ext cx="6163408" cy="2308324"/>
+            <a:ext cx="6163408" cy="2492990"/>
           </a:xfrm>
           <a:prstGeom prst="rect">
             <a:avLst/>
@@ -4363,7 +4359,25 @@
             </a:pPr>
             <a:r>
               <a:rPr lang="en-US" sz="1200" dirty="0" smtClean="0"/>
-              <a:t>Version alpha 1 - Just a playing area and a score box.  Number in score box increments each time I click in the playing area. (5/11)</a:t>
+              <a:t>Learn to use GIT and set </a:t>
+            </a:r>
+            <a:r>
+              <a:rPr lang="en-US" sz="1200" smtClean="0"/>
+              <a:t>up repository</a:t>
+            </a:r>
+          </a:p>
+          <a:p>
+            <a:pPr marL="171450" indent="-171450">
+              <a:buFont typeface="Arial" panose="020B0604020202020204" pitchFamily="34" charset="0"/>
+              <a:buChar char="•"/>
+            </a:pPr>
+            <a:r>
+              <a:rPr lang="en-US" sz="1200" smtClean="0"/>
+              <a:t>Version </a:t>
+            </a:r>
+            <a:r>
+              <a:rPr lang="en-US" sz="1200" dirty="0" smtClean="0"/>
+              <a:t>alpha 1 - Just a playing area and a score box.  Number in score box increments each time I click in the playing area. (5/11)</a:t>
             </a:r>
           </a:p>
           <a:p>
@@ -4395,7 +4409,6 @@
               <a:rPr lang="en-US" sz="1200" dirty="0" smtClean="0"/>
               <a:t>Test – click around and see that it works…</a:t>
             </a:r>
-            <a:endParaRPr lang="en-US" sz="1200" dirty="0" smtClean="0"/>
           </a:p>
           <a:p>
             <a:pPr marL="171450" indent="-171450">

</xml_diff>

<commit_message>
Making changes to test a new commit
</commit_message>
<xml_diff>
--- a/TZBsGhostBlitz.pptx
+++ b/TZBsGhostBlitz.pptx
@@ -4363,8 +4363,13 @@
             </a:r>
             <a:r>
               <a:rPr lang="en-US" sz="1200" smtClean="0"/>
-              <a:t>up repository</a:t>
-            </a:r>
+              <a:t>up </a:t>
+            </a:r>
+            <a:r>
+              <a:rPr lang="en-US" sz="1200" smtClean="0"/>
+              <a:t>repository (done 5/8)</a:t>
+            </a:r>
+            <a:endParaRPr lang="en-US" sz="1200" smtClean="0"/>
           </a:p>
           <a:p>
             <a:pPr marL="171450" indent="-171450">
@@ -4372,12 +4377,8 @@
               <a:buChar char="•"/>
             </a:pPr>
             <a:r>
-              <a:rPr lang="en-US" sz="1200" smtClean="0"/>
-              <a:t>Version </a:t>
-            </a:r>
-            <a:r>
               <a:rPr lang="en-US" sz="1200" dirty="0" smtClean="0"/>
-              <a:t>alpha 1 - Just a playing area and a score box.  Number in score box increments each time I click in the playing area. (5/11)</a:t>
+              <a:t>Version alpha 1 - Just a playing area and a score box.  Number in score box increments each time I click in the playing area. (5/11)</a:t>
             </a:r>
           </a:p>
           <a:p>

</xml_diff>